<commit_message>
added info to readme
</commit_message>
<xml_diff>
--- a/inst/textshape_logo/r_textshape.pptx
+++ b/inst/textshape_logo/r_textshape.pptx
@@ -243,7 +243,7 @@
           <a:p>
             <a:fld id="{DC543128-6B2F-4E1B-8CDA-E6AA3E44DC33}" type="datetimeFigureOut">
               <a:rPr lang="en-US" smtClean="0"/>
-              <a:t>3/8/2015</a:t>
+              <a:t>10/17/2015</a:t>
             </a:fld>
             <a:endParaRPr lang="en-US"/>
           </a:p>
@@ -413,7 +413,7 @@
           <a:p>
             <a:fld id="{DC543128-6B2F-4E1B-8CDA-E6AA3E44DC33}" type="datetimeFigureOut">
               <a:rPr lang="en-US" smtClean="0"/>
-              <a:t>3/8/2015</a:t>
+              <a:t>10/17/2015</a:t>
             </a:fld>
             <a:endParaRPr lang="en-US"/>
           </a:p>
@@ -593,7 +593,7 @@
           <a:p>
             <a:fld id="{DC543128-6B2F-4E1B-8CDA-E6AA3E44DC33}" type="datetimeFigureOut">
               <a:rPr lang="en-US" smtClean="0"/>
-              <a:t>3/8/2015</a:t>
+              <a:t>10/17/2015</a:t>
             </a:fld>
             <a:endParaRPr lang="en-US"/>
           </a:p>
@@ -763,7 +763,7 @@
           <a:p>
             <a:fld id="{DC543128-6B2F-4E1B-8CDA-E6AA3E44DC33}" type="datetimeFigureOut">
               <a:rPr lang="en-US" smtClean="0"/>
-              <a:t>3/8/2015</a:t>
+              <a:t>10/17/2015</a:t>
             </a:fld>
             <a:endParaRPr lang="en-US"/>
           </a:p>
@@ -1009,7 +1009,7 @@
           <a:p>
             <a:fld id="{DC543128-6B2F-4E1B-8CDA-E6AA3E44DC33}" type="datetimeFigureOut">
               <a:rPr lang="en-US" smtClean="0"/>
-              <a:t>3/8/2015</a:t>
+              <a:t>10/17/2015</a:t>
             </a:fld>
             <a:endParaRPr lang="en-US"/>
           </a:p>
@@ -1241,7 +1241,7 @@
           <a:p>
             <a:fld id="{DC543128-6B2F-4E1B-8CDA-E6AA3E44DC33}" type="datetimeFigureOut">
               <a:rPr lang="en-US" smtClean="0"/>
-              <a:t>3/8/2015</a:t>
+              <a:t>10/17/2015</a:t>
             </a:fld>
             <a:endParaRPr lang="en-US"/>
           </a:p>
@@ -1608,7 +1608,7 @@
           <a:p>
             <a:fld id="{DC543128-6B2F-4E1B-8CDA-E6AA3E44DC33}" type="datetimeFigureOut">
               <a:rPr lang="en-US" smtClean="0"/>
-              <a:t>3/8/2015</a:t>
+              <a:t>10/17/2015</a:t>
             </a:fld>
             <a:endParaRPr lang="en-US"/>
           </a:p>
@@ -1726,7 +1726,7 @@
           <a:p>
             <a:fld id="{DC543128-6B2F-4E1B-8CDA-E6AA3E44DC33}" type="datetimeFigureOut">
               <a:rPr lang="en-US" smtClean="0"/>
-              <a:t>3/8/2015</a:t>
+              <a:t>10/17/2015</a:t>
             </a:fld>
             <a:endParaRPr lang="en-US"/>
           </a:p>
@@ -1821,7 +1821,7 @@
           <a:p>
             <a:fld id="{DC543128-6B2F-4E1B-8CDA-E6AA3E44DC33}" type="datetimeFigureOut">
               <a:rPr lang="en-US" smtClean="0"/>
-              <a:t>3/8/2015</a:t>
+              <a:t>10/17/2015</a:t>
             </a:fld>
             <a:endParaRPr lang="en-US"/>
           </a:p>
@@ -2098,7 +2098,7 @@
           <a:p>
             <a:fld id="{DC543128-6B2F-4E1B-8CDA-E6AA3E44DC33}" type="datetimeFigureOut">
               <a:rPr lang="en-US" smtClean="0"/>
-              <a:t>3/8/2015</a:t>
+              <a:t>10/17/2015</a:t>
             </a:fld>
             <a:endParaRPr lang="en-US"/>
           </a:p>
@@ -2351,7 +2351,7 @@
           <a:p>
             <a:fld id="{DC543128-6B2F-4E1B-8CDA-E6AA3E44DC33}" type="datetimeFigureOut">
               <a:rPr lang="en-US" smtClean="0"/>
-              <a:t>3/8/2015</a:t>
+              <a:t>10/17/2015</a:t>
             </a:fld>
             <a:endParaRPr lang="en-US"/>
           </a:p>
@@ -2564,7 +2564,7 @@
           <a:p>
             <a:fld id="{DC543128-6B2F-4E1B-8CDA-E6AA3E44DC33}" type="datetimeFigureOut">
               <a:rPr lang="en-US" smtClean="0"/>
-              <a:t>3/8/2015</a:t>
+              <a:t>10/17/2015</a:t>
             </a:fld>
             <a:endParaRPr lang="en-US"/>
           </a:p>
@@ -2969,6 +2969,107 @@
           <a:chExt cx="0" cy="0"/>
         </a:xfrm>
       </p:grpSpPr>
+      <p:grpSp>
+        <p:nvGrpSpPr>
+          <p:cNvPr id="3" name="Group 2"/>
+          <p:cNvGrpSpPr/>
+          <p:nvPr/>
+        </p:nvGrpSpPr>
+        <p:grpSpPr>
+          <a:xfrm>
+            <a:off x="681872" y="2027726"/>
+            <a:ext cx="2659683" cy="2570906"/>
+            <a:chOff x="681872" y="2027726"/>
+            <a:chExt cx="2659683" cy="2570906"/>
+          </a:xfrm>
+        </p:grpSpPr>
+        <p:pic>
+          <p:nvPicPr>
+            <p:cNvPr id="1026" name="Picture 2" descr="http://cdn.flaticon.com/png/256/25519.png"/>
+            <p:cNvPicPr>
+              <a:picLocks noChangeAspect="1" noChangeArrowheads="1"/>
+            </p:cNvPicPr>
+            <p:nvPr/>
+          </p:nvPicPr>
+          <p:blipFill>
+            <a:blip r:embed="rId2">
+              <a:extLst>
+                <a:ext uri="{28A0092B-C50C-407E-A947-70E740481C1C}">
+                  <a14:useLocalDpi xmlns:a14="http://schemas.microsoft.com/office/drawing/2010/main" val="0"/>
+                </a:ext>
+              </a:extLst>
+            </a:blip>
+            <a:srcRect/>
+            <a:stretch>
+              <a:fillRect/>
+            </a:stretch>
+          </p:blipFill>
+          <p:spPr bwMode="auto">
+            <a:xfrm>
+              <a:off x="770649" y="2027726"/>
+              <a:ext cx="2570906" cy="2570906"/>
+            </a:xfrm>
+            <a:prstGeom prst="rect">
+              <a:avLst/>
+            </a:prstGeom>
+            <a:noFill/>
+            <a:ln>
+              <a:noFill/>
+            </a:ln>
+            <a:extLst>
+              <a:ext uri="{909E8E84-426E-40DD-AFC4-6F175D3DCCD1}">
+                <a14:hiddenFill xmlns:a14="http://schemas.microsoft.com/office/drawing/2010/main">
+                  <a:solidFill>
+                    <a:srgbClr val="FFFFFF"/>
+                  </a:solidFill>
+                </a14:hiddenFill>
+              </a:ext>
+            </a:extLst>
+          </p:spPr>
+        </p:pic>
+        <p:sp>
+          <p:nvSpPr>
+            <p:cNvPr id="2" name="TextBox 1"/>
+            <p:cNvSpPr txBox="1"/>
+            <p:nvPr/>
+          </p:nvSpPr>
+          <p:spPr>
+            <a:xfrm>
+              <a:off x="681872" y="2027726"/>
+              <a:ext cx="2570906" cy="707886"/>
+            </a:xfrm>
+            <a:prstGeom prst="rect">
+              <a:avLst/>
+            </a:prstGeom>
+            <a:noFill/>
+          </p:spPr>
+          <p:txBody>
+            <a:bodyPr wrap="square" rtlCol="0">
+              <a:spAutoFit/>
+            </a:bodyPr>
+            <a:lstStyle/>
+            <a:p>
+              <a:r>
+                <a:rPr lang="en-US" sz="4000" dirty="0" smtClean="0">
+                  <a:solidFill>
+                    <a:schemeClr val="accent1">
+                      <a:lumMod val="75000"/>
+                    </a:schemeClr>
+                  </a:solidFill>
+                </a:rPr>
+                <a:t>textshape</a:t>
+              </a:r>
+              <a:endParaRPr lang="en-US" sz="4000" dirty="0">
+                <a:solidFill>
+                  <a:schemeClr val="accent1">
+                    <a:lumMod val="75000"/>
+                  </a:schemeClr>
+                </a:solidFill>
+              </a:endParaRPr>
+            </a:p>
+          </p:txBody>
+        </p:sp>
+      </p:grpSp>
     </p:spTree>
     <p:extLst>
       <p:ext uri="{BB962C8B-B14F-4D97-AF65-F5344CB8AC3E}">

</xml_diff>